<commit_message>
ez54 update for SPIRE X509
</commit_message>
<xml_diff>
--- a/WKSHP-SPIRE-Envoy-X509/Pictures/SPiffe-Envoy-Diagram.pptx
+++ b/WKSHP-SPIRE-Envoy-X509/Pictures/SPiffe-Envoy-Diagram.pptx
@@ -243,7 +243,7 @@
           <a:p>
             <a:fld id="{4E5F30B6-9ECE-4627-AC14-BF34DE85A8F8}" type="datetimeFigureOut">
               <a:rPr lang="en-GB" smtClean="0"/>
-              <a:t>02/09/2021</a:t>
+              <a:t>15/12/2021</a:t>
             </a:fld>
             <a:endParaRPr lang="en-GB"/>
           </a:p>
@@ -413,7 +413,7 @@
           <a:p>
             <a:fld id="{4E5F30B6-9ECE-4627-AC14-BF34DE85A8F8}" type="datetimeFigureOut">
               <a:rPr lang="en-GB" smtClean="0"/>
-              <a:t>02/09/2021</a:t>
+              <a:t>15/12/2021</a:t>
             </a:fld>
             <a:endParaRPr lang="en-GB"/>
           </a:p>
@@ -593,7 +593,7 @@
           <a:p>
             <a:fld id="{4E5F30B6-9ECE-4627-AC14-BF34DE85A8F8}" type="datetimeFigureOut">
               <a:rPr lang="en-GB" smtClean="0"/>
-              <a:t>02/09/2021</a:t>
+              <a:t>15/12/2021</a:t>
             </a:fld>
             <a:endParaRPr lang="en-GB"/>
           </a:p>
@@ -763,7 +763,7 @@
           <a:p>
             <a:fld id="{4E5F30B6-9ECE-4627-AC14-BF34DE85A8F8}" type="datetimeFigureOut">
               <a:rPr lang="en-GB" smtClean="0"/>
-              <a:t>02/09/2021</a:t>
+              <a:t>15/12/2021</a:t>
             </a:fld>
             <a:endParaRPr lang="en-GB"/>
           </a:p>
@@ -1009,7 +1009,7 @@
           <a:p>
             <a:fld id="{4E5F30B6-9ECE-4627-AC14-BF34DE85A8F8}" type="datetimeFigureOut">
               <a:rPr lang="en-GB" smtClean="0"/>
-              <a:t>02/09/2021</a:t>
+              <a:t>15/12/2021</a:t>
             </a:fld>
             <a:endParaRPr lang="en-GB"/>
           </a:p>
@@ -1241,7 +1241,7 @@
           <a:p>
             <a:fld id="{4E5F30B6-9ECE-4627-AC14-BF34DE85A8F8}" type="datetimeFigureOut">
               <a:rPr lang="en-GB" smtClean="0"/>
-              <a:t>02/09/2021</a:t>
+              <a:t>15/12/2021</a:t>
             </a:fld>
             <a:endParaRPr lang="en-GB"/>
           </a:p>
@@ -1608,7 +1608,7 @@
           <a:p>
             <a:fld id="{4E5F30B6-9ECE-4627-AC14-BF34DE85A8F8}" type="datetimeFigureOut">
               <a:rPr lang="en-GB" smtClean="0"/>
-              <a:t>02/09/2021</a:t>
+              <a:t>15/12/2021</a:t>
             </a:fld>
             <a:endParaRPr lang="en-GB"/>
           </a:p>
@@ -1726,7 +1726,7 @@
           <a:p>
             <a:fld id="{4E5F30B6-9ECE-4627-AC14-BF34DE85A8F8}" type="datetimeFigureOut">
               <a:rPr lang="en-GB" smtClean="0"/>
-              <a:t>02/09/2021</a:t>
+              <a:t>15/12/2021</a:t>
             </a:fld>
             <a:endParaRPr lang="en-GB"/>
           </a:p>
@@ -1821,7 +1821,7 @@
           <a:p>
             <a:fld id="{4E5F30B6-9ECE-4627-AC14-BF34DE85A8F8}" type="datetimeFigureOut">
               <a:rPr lang="en-GB" smtClean="0"/>
-              <a:t>02/09/2021</a:t>
+              <a:t>15/12/2021</a:t>
             </a:fld>
             <a:endParaRPr lang="en-GB"/>
           </a:p>
@@ -2098,7 +2098,7 @@
           <a:p>
             <a:fld id="{4E5F30B6-9ECE-4627-AC14-BF34DE85A8F8}" type="datetimeFigureOut">
               <a:rPr lang="en-GB" smtClean="0"/>
-              <a:t>02/09/2021</a:t>
+              <a:t>15/12/2021</a:t>
             </a:fld>
             <a:endParaRPr lang="en-GB"/>
           </a:p>
@@ -2351,7 +2351,7 @@
           <a:p>
             <a:fld id="{4E5F30B6-9ECE-4627-AC14-BF34DE85A8F8}" type="datetimeFigureOut">
               <a:rPr lang="en-GB" smtClean="0"/>
-              <a:t>02/09/2021</a:t>
+              <a:t>15/12/2021</a:t>
             </a:fld>
             <a:endParaRPr lang="en-GB"/>
           </a:p>
@@ -2564,7 +2564,7 @@
           <a:p>
             <a:fld id="{4E5F30B6-9ECE-4627-AC14-BF34DE85A8F8}" type="datetimeFigureOut">
               <a:rPr lang="en-GB" smtClean="0"/>
-              <a:t>02/09/2021</a:t>
+              <a:t>15/12/2021</a:t>
             </a:fld>
             <a:endParaRPr lang="en-GB"/>
           </a:p>
@@ -3293,6 +3293,594 @@
           </a:p>
         </p:txBody>
       </p:sp>
+      <p:sp>
+        <p:nvSpPr>
+          <p:cNvPr id="5" name="TextBox 4"/>
+          <p:cNvSpPr txBox="1"/>
+          <p:nvPr/>
+        </p:nvSpPr>
+        <p:spPr>
+          <a:xfrm>
+            <a:off x="9665208" y="4212305"/>
+            <a:ext cx="457200" cy="338554"/>
+          </a:xfrm>
+          <a:prstGeom prst="rect">
+            <a:avLst/>
+          </a:prstGeom>
+          <a:noFill/>
+        </p:spPr>
+        <p:txBody>
+          <a:bodyPr wrap="square" rtlCol="0">
+            <a:spAutoFit/>
+          </a:bodyPr>
+          <a:lstStyle/>
+          <a:p>
+            <a:r>
+              <a:rPr lang="en-US" sz="800" dirty="0" smtClean="0"/>
+              <a:t>Port: 3002</a:t>
+            </a:r>
+            <a:endParaRPr lang="en-GB" sz="800" dirty="0"/>
+          </a:p>
+        </p:txBody>
+      </p:sp>
+      <p:sp>
+        <p:nvSpPr>
+          <p:cNvPr id="11" name="TextBox 10"/>
+          <p:cNvSpPr txBox="1"/>
+          <p:nvPr/>
+        </p:nvSpPr>
+        <p:spPr>
+          <a:xfrm>
+            <a:off x="2145792" y="4213911"/>
+            <a:ext cx="457200" cy="338554"/>
+          </a:xfrm>
+          <a:prstGeom prst="rect">
+            <a:avLst/>
+          </a:prstGeom>
+          <a:noFill/>
+        </p:spPr>
+        <p:txBody>
+          <a:bodyPr wrap="square" rtlCol="0">
+            <a:spAutoFit/>
+          </a:bodyPr>
+          <a:lstStyle/>
+          <a:p>
+            <a:r>
+              <a:rPr lang="en-US" sz="800" dirty="0" smtClean="0"/>
+              <a:t>Port: 3000</a:t>
+            </a:r>
+            <a:endParaRPr lang="en-GB" sz="800" dirty="0"/>
+          </a:p>
+        </p:txBody>
+      </p:sp>
+      <p:sp>
+        <p:nvSpPr>
+          <p:cNvPr id="13" name="TextBox 12"/>
+          <p:cNvSpPr txBox="1"/>
+          <p:nvPr/>
+        </p:nvSpPr>
+        <p:spPr>
+          <a:xfrm>
+            <a:off x="3486912" y="4211793"/>
+            <a:ext cx="457200" cy="338554"/>
+          </a:xfrm>
+          <a:prstGeom prst="rect">
+            <a:avLst/>
+          </a:prstGeom>
+          <a:noFill/>
+        </p:spPr>
+        <p:txBody>
+          <a:bodyPr wrap="square" rtlCol="0">
+            <a:spAutoFit/>
+          </a:bodyPr>
+          <a:lstStyle/>
+          <a:p>
+            <a:r>
+              <a:rPr lang="en-US" sz="800" dirty="0" smtClean="0"/>
+              <a:t>Port: 3001</a:t>
+            </a:r>
+            <a:endParaRPr lang="en-GB" sz="800" dirty="0"/>
+          </a:p>
+        </p:txBody>
+      </p:sp>
+      <p:sp>
+        <p:nvSpPr>
+          <p:cNvPr id="14" name="TextBox 13"/>
+          <p:cNvSpPr txBox="1"/>
+          <p:nvPr/>
+        </p:nvSpPr>
+        <p:spPr>
+          <a:xfrm>
+            <a:off x="8397240" y="4231175"/>
+            <a:ext cx="457200" cy="338554"/>
+          </a:xfrm>
+          <a:prstGeom prst="rect">
+            <a:avLst/>
+          </a:prstGeom>
+          <a:noFill/>
+        </p:spPr>
+        <p:txBody>
+          <a:bodyPr wrap="square" rtlCol="0">
+            <a:spAutoFit/>
+          </a:bodyPr>
+          <a:lstStyle/>
+          <a:p>
+            <a:r>
+              <a:rPr lang="en-US" sz="800" dirty="0" smtClean="0"/>
+              <a:t>Port: 3003</a:t>
+            </a:r>
+            <a:endParaRPr lang="en-GB" sz="800" dirty="0"/>
+          </a:p>
+        </p:txBody>
+      </p:sp>
+      <p:sp>
+        <p:nvSpPr>
+          <p:cNvPr id="15" name="TextBox 14"/>
+          <p:cNvSpPr txBox="1"/>
+          <p:nvPr/>
+        </p:nvSpPr>
+        <p:spPr>
+          <a:xfrm>
+            <a:off x="6294120" y="5042967"/>
+            <a:ext cx="457200" cy="338554"/>
+          </a:xfrm>
+          <a:prstGeom prst="rect">
+            <a:avLst/>
+          </a:prstGeom>
+          <a:noFill/>
+        </p:spPr>
+        <p:txBody>
+          <a:bodyPr wrap="square" rtlCol="0">
+            <a:spAutoFit/>
+          </a:bodyPr>
+          <a:lstStyle/>
+          <a:p>
+            <a:r>
+              <a:rPr lang="en-US" sz="800" dirty="0" smtClean="0"/>
+              <a:t>Port: 80</a:t>
+            </a:r>
+            <a:endParaRPr lang="en-GB" sz="800" dirty="0"/>
+          </a:p>
+        </p:txBody>
+      </p:sp>
+      <p:sp>
+        <p:nvSpPr>
+          <p:cNvPr id="16" name="TextBox 15"/>
+          <p:cNvSpPr txBox="1"/>
+          <p:nvPr/>
+        </p:nvSpPr>
+        <p:spPr>
+          <a:xfrm>
+            <a:off x="6214872" y="4222031"/>
+            <a:ext cx="457200" cy="338554"/>
+          </a:xfrm>
+          <a:prstGeom prst="rect">
+            <a:avLst/>
+          </a:prstGeom>
+          <a:noFill/>
+        </p:spPr>
+        <p:txBody>
+          <a:bodyPr wrap="square" rtlCol="0">
+            <a:spAutoFit/>
+          </a:bodyPr>
+          <a:lstStyle/>
+          <a:p>
+            <a:r>
+              <a:rPr lang="en-US" sz="800" dirty="0" smtClean="0"/>
+              <a:t>Port: 9001</a:t>
+            </a:r>
+            <a:endParaRPr lang="en-GB" sz="800" dirty="0"/>
+          </a:p>
+        </p:txBody>
+      </p:sp>
+      <p:sp>
+        <p:nvSpPr>
+          <p:cNvPr id="17" name="TextBox 10"/>
+          <p:cNvSpPr txBox="1"/>
+          <p:nvPr/>
+        </p:nvSpPr>
+        <p:spPr>
+          <a:xfrm>
+            <a:off x="6169150" y="3345184"/>
+            <a:ext cx="569281" cy="215444"/>
+          </a:xfrm>
+          <a:prstGeom prst="rect">
+            <a:avLst/>
+          </a:prstGeom>
+          <a:noFill/>
+        </p:spPr>
+        <p:txBody>
+          <a:bodyPr wrap="square" rtlCol="0">
+            <a:spAutoFit/>
+          </a:bodyPr>
+          <a:lstStyle>
+            <a:defPPr>
+              <a:defRPr lang="en-US"/>
+            </a:defPPr>
+            <a:lvl1pPr marL="0" algn="l" defTabSz="914400" rtl="0" eaLnBrk="1" latinLnBrk="0" hangingPunct="1">
+              <a:defRPr sz="1800" kern="1200">
+                <a:solidFill>
+                  <a:schemeClr val="tx1"/>
+                </a:solidFill>
+                <a:latin typeface="+mn-lt"/>
+                <a:ea typeface="+mn-ea"/>
+                <a:cs typeface="+mn-cs"/>
+              </a:defRPr>
+            </a:lvl1pPr>
+            <a:lvl2pPr marL="457200" algn="l" defTabSz="914400" rtl="0" eaLnBrk="1" latinLnBrk="0" hangingPunct="1">
+              <a:defRPr sz="1800" kern="1200">
+                <a:solidFill>
+                  <a:schemeClr val="tx1"/>
+                </a:solidFill>
+                <a:latin typeface="+mn-lt"/>
+                <a:ea typeface="+mn-ea"/>
+                <a:cs typeface="+mn-cs"/>
+              </a:defRPr>
+            </a:lvl2pPr>
+            <a:lvl3pPr marL="914400" algn="l" defTabSz="914400" rtl="0" eaLnBrk="1" latinLnBrk="0" hangingPunct="1">
+              <a:defRPr sz="1800" kern="1200">
+                <a:solidFill>
+                  <a:schemeClr val="tx1"/>
+                </a:solidFill>
+                <a:latin typeface="+mn-lt"/>
+                <a:ea typeface="+mn-ea"/>
+                <a:cs typeface="+mn-cs"/>
+              </a:defRPr>
+            </a:lvl3pPr>
+            <a:lvl4pPr marL="1371600" algn="l" defTabSz="914400" rtl="0" eaLnBrk="1" latinLnBrk="0" hangingPunct="1">
+              <a:defRPr sz="1800" kern="1200">
+                <a:solidFill>
+                  <a:schemeClr val="tx1"/>
+                </a:solidFill>
+                <a:latin typeface="+mn-lt"/>
+                <a:ea typeface="+mn-ea"/>
+                <a:cs typeface="+mn-cs"/>
+              </a:defRPr>
+            </a:lvl4pPr>
+            <a:lvl5pPr marL="1828800" algn="l" defTabSz="914400" rtl="0" eaLnBrk="1" latinLnBrk="0" hangingPunct="1">
+              <a:defRPr sz="1800" kern="1200">
+                <a:solidFill>
+                  <a:schemeClr val="tx1"/>
+                </a:solidFill>
+                <a:latin typeface="+mn-lt"/>
+                <a:ea typeface="+mn-ea"/>
+                <a:cs typeface="+mn-cs"/>
+              </a:defRPr>
+            </a:lvl5pPr>
+            <a:lvl6pPr marL="2286000" algn="l" defTabSz="914400" rtl="0" eaLnBrk="1" latinLnBrk="0" hangingPunct="1">
+              <a:defRPr sz="1800" kern="1200">
+                <a:solidFill>
+                  <a:schemeClr val="tx1"/>
+                </a:solidFill>
+                <a:latin typeface="+mn-lt"/>
+                <a:ea typeface="+mn-ea"/>
+                <a:cs typeface="+mn-cs"/>
+              </a:defRPr>
+            </a:lvl6pPr>
+            <a:lvl7pPr marL="2743200" algn="l" defTabSz="914400" rtl="0" eaLnBrk="1" latinLnBrk="0" hangingPunct="1">
+              <a:defRPr sz="1800" kern="1200">
+                <a:solidFill>
+                  <a:schemeClr val="tx1"/>
+                </a:solidFill>
+                <a:latin typeface="+mn-lt"/>
+                <a:ea typeface="+mn-ea"/>
+                <a:cs typeface="+mn-cs"/>
+              </a:defRPr>
+            </a:lvl7pPr>
+            <a:lvl8pPr marL="3200400" algn="l" defTabSz="914400" rtl="0" eaLnBrk="1" latinLnBrk="0" hangingPunct="1">
+              <a:defRPr sz="1800" kern="1200">
+                <a:solidFill>
+                  <a:schemeClr val="tx1"/>
+                </a:solidFill>
+                <a:latin typeface="+mn-lt"/>
+                <a:ea typeface="+mn-ea"/>
+                <a:cs typeface="+mn-cs"/>
+              </a:defRPr>
+            </a:lvl8pPr>
+            <a:lvl9pPr marL="3657600" algn="l" defTabSz="914400" rtl="0" eaLnBrk="1" latinLnBrk="0" hangingPunct="1">
+              <a:defRPr sz="1800" kern="1200">
+                <a:solidFill>
+                  <a:schemeClr val="tx1"/>
+                </a:solidFill>
+                <a:latin typeface="+mn-lt"/>
+                <a:ea typeface="+mn-ea"/>
+                <a:cs typeface="+mn-cs"/>
+              </a:defRPr>
+            </a:lvl9pPr>
+          </a:lstStyle>
+          <a:p>
+            <a:r>
+              <a:rPr lang="en-US" sz="800" dirty="0" smtClean="0">
+                <a:solidFill>
+                  <a:schemeClr val="accent1">
+                    <a:lumMod val="50000"/>
+                  </a:schemeClr>
+                </a:solidFill>
+              </a:rPr>
+              <a:t>Wkl API</a:t>
+            </a:r>
+            <a:endParaRPr lang="en-GB" sz="800" dirty="0">
+              <a:solidFill>
+                <a:schemeClr val="accent1">
+                  <a:lumMod val="50000"/>
+                </a:schemeClr>
+              </a:solidFill>
+            </a:endParaRPr>
+          </a:p>
+        </p:txBody>
+      </p:sp>
+      <p:sp>
+        <p:nvSpPr>
+          <p:cNvPr id="18" name="TextBox 10"/>
+          <p:cNvSpPr txBox="1"/>
+          <p:nvPr/>
+        </p:nvSpPr>
+        <p:spPr>
+          <a:xfrm>
+            <a:off x="8265029" y="3326107"/>
+            <a:ext cx="569281" cy="215444"/>
+          </a:xfrm>
+          <a:prstGeom prst="rect">
+            <a:avLst/>
+          </a:prstGeom>
+          <a:noFill/>
+        </p:spPr>
+        <p:txBody>
+          <a:bodyPr wrap="square" rtlCol="0">
+            <a:spAutoFit/>
+          </a:bodyPr>
+          <a:lstStyle>
+            <a:defPPr>
+              <a:defRPr lang="en-US"/>
+            </a:defPPr>
+            <a:lvl1pPr marL="0" algn="l" defTabSz="914400" rtl="0" eaLnBrk="1" latinLnBrk="0" hangingPunct="1">
+              <a:defRPr sz="1800" kern="1200">
+                <a:solidFill>
+                  <a:schemeClr val="tx1"/>
+                </a:solidFill>
+                <a:latin typeface="+mn-lt"/>
+                <a:ea typeface="+mn-ea"/>
+                <a:cs typeface="+mn-cs"/>
+              </a:defRPr>
+            </a:lvl1pPr>
+            <a:lvl2pPr marL="457200" algn="l" defTabSz="914400" rtl="0" eaLnBrk="1" latinLnBrk="0" hangingPunct="1">
+              <a:defRPr sz="1800" kern="1200">
+                <a:solidFill>
+                  <a:schemeClr val="tx1"/>
+                </a:solidFill>
+                <a:latin typeface="+mn-lt"/>
+                <a:ea typeface="+mn-ea"/>
+                <a:cs typeface="+mn-cs"/>
+              </a:defRPr>
+            </a:lvl2pPr>
+            <a:lvl3pPr marL="914400" algn="l" defTabSz="914400" rtl="0" eaLnBrk="1" latinLnBrk="0" hangingPunct="1">
+              <a:defRPr sz="1800" kern="1200">
+                <a:solidFill>
+                  <a:schemeClr val="tx1"/>
+                </a:solidFill>
+                <a:latin typeface="+mn-lt"/>
+                <a:ea typeface="+mn-ea"/>
+                <a:cs typeface="+mn-cs"/>
+              </a:defRPr>
+            </a:lvl3pPr>
+            <a:lvl4pPr marL="1371600" algn="l" defTabSz="914400" rtl="0" eaLnBrk="1" latinLnBrk="0" hangingPunct="1">
+              <a:defRPr sz="1800" kern="1200">
+                <a:solidFill>
+                  <a:schemeClr val="tx1"/>
+                </a:solidFill>
+                <a:latin typeface="+mn-lt"/>
+                <a:ea typeface="+mn-ea"/>
+                <a:cs typeface="+mn-cs"/>
+              </a:defRPr>
+            </a:lvl4pPr>
+            <a:lvl5pPr marL="1828800" algn="l" defTabSz="914400" rtl="0" eaLnBrk="1" latinLnBrk="0" hangingPunct="1">
+              <a:defRPr sz="1800" kern="1200">
+                <a:solidFill>
+                  <a:schemeClr val="tx1"/>
+                </a:solidFill>
+                <a:latin typeface="+mn-lt"/>
+                <a:ea typeface="+mn-ea"/>
+                <a:cs typeface="+mn-cs"/>
+              </a:defRPr>
+            </a:lvl5pPr>
+            <a:lvl6pPr marL="2286000" algn="l" defTabSz="914400" rtl="0" eaLnBrk="1" latinLnBrk="0" hangingPunct="1">
+              <a:defRPr sz="1800" kern="1200">
+                <a:solidFill>
+                  <a:schemeClr val="tx1"/>
+                </a:solidFill>
+                <a:latin typeface="+mn-lt"/>
+                <a:ea typeface="+mn-ea"/>
+                <a:cs typeface="+mn-cs"/>
+              </a:defRPr>
+            </a:lvl6pPr>
+            <a:lvl7pPr marL="2743200" algn="l" defTabSz="914400" rtl="0" eaLnBrk="1" latinLnBrk="0" hangingPunct="1">
+              <a:defRPr sz="1800" kern="1200">
+                <a:solidFill>
+                  <a:schemeClr val="tx1"/>
+                </a:solidFill>
+                <a:latin typeface="+mn-lt"/>
+                <a:ea typeface="+mn-ea"/>
+                <a:cs typeface="+mn-cs"/>
+              </a:defRPr>
+            </a:lvl7pPr>
+            <a:lvl8pPr marL="3200400" algn="l" defTabSz="914400" rtl="0" eaLnBrk="1" latinLnBrk="0" hangingPunct="1">
+              <a:defRPr sz="1800" kern="1200">
+                <a:solidFill>
+                  <a:schemeClr val="tx1"/>
+                </a:solidFill>
+                <a:latin typeface="+mn-lt"/>
+                <a:ea typeface="+mn-ea"/>
+                <a:cs typeface="+mn-cs"/>
+              </a:defRPr>
+            </a:lvl8pPr>
+            <a:lvl9pPr marL="3657600" algn="l" defTabSz="914400" rtl="0" eaLnBrk="1" latinLnBrk="0" hangingPunct="1">
+              <a:defRPr sz="1800" kern="1200">
+                <a:solidFill>
+                  <a:schemeClr val="tx1"/>
+                </a:solidFill>
+                <a:latin typeface="+mn-lt"/>
+                <a:ea typeface="+mn-ea"/>
+                <a:cs typeface="+mn-cs"/>
+              </a:defRPr>
+            </a:lvl9pPr>
+          </a:lstStyle>
+          <a:p>
+            <a:r>
+              <a:rPr lang="en-US" sz="800" dirty="0" smtClean="0">
+                <a:solidFill>
+                  <a:schemeClr val="accent1">
+                    <a:lumMod val="50000"/>
+                  </a:schemeClr>
+                </a:solidFill>
+              </a:rPr>
+              <a:t>Wkl API</a:t>
+            </a:r>
+            <a:endParaRPr lang="en-GB" sz="800" dirty="0">
+              <a:solidFill>
+                <a:schemeClr val="accent1">
+                  <a:lumMod val="50000"/>
+                </a:schemeClr>
+              </a:solidFill>
+            </a:endParaRPr>
+          </a:p>
+        </p:txBody>
+      </p:sp>
+      <p:sp>
+        <p:nvSpPr>
+          <p:cNvPr id="19" name="TextBox 10"/>
+          <p:cNvSpPr txBox="1"/>
+          <p:nvPr/>
+        </p:nvSpPr>
+        <p:spPr>
+          <a:xfrm>
+            <a:off x="4073271" y="3345184"/>
+            <a:ext cx="569281" cy="215444"/>
+          </a:xfrm>
+          <a:prstGeom prst="rect">
+            <a:avLst/>
+          </a:prstGeom>
+          <a:noFill/>
+        </p:spPr>
+        <p:txBody>
+          <a:bodyPr wrap="square" rtlCol="0">
+            <a:spAutoFit/>
+          </a:bodyPr>
+          <a:lstStyle>
+            <a:defPPr>
+              <a:defRPr lang="en-US"/>
+            </a:defPPr>
+            <a:lvl1pPr marL="0" algn="l" defTabSz="914400" rtl="0" eaLnBrk="1" latinLnBrk="0" hangingPunct="1">
+              <a:defRPr sz="1800" kern="1200">
+                <a:solidFill>
+                  <a:schemeClr val="tx1"/>
+                </a:solidFill>
+                <a:latin typeface="+mn-lt"/>
+                <a:ea typeface="+mn-ea"/>
+                <a:cs typeface="+mn-cs"/>
+              </a:defRPr>
+            </a:lvl1pPr>
+            <a:lvl2pPr marL="457200" algn="l" defTabSz="914400" rtl="0" eaLnBrk="1" latinLnBrk="0" hangingPunct="1">
+              <a:defRPr sz="1800" kern="1200">
+                <a:solidFill>
+                  <a:schemeClr val="tx1"/>
+                </a:solidFill>
+                <a:latin typeface="+mn-lt"/>
+                <a:ea typeface="+mn-ea"/>
+                <a:cs typeface="+mn-cs"/>
+              </a:defRPr>
+            </a:lvl2pPr>
+            <a:lvl3pPr marL="914400" algn="l" defTabSz="914400" rtl="0" eaLnBrk="1" latinLnBrk="0" hangingPunct="1">
+              <a:defRPr sz="1800" kern="1200">
+                <a:solidFill>
+                  <a:schemeClr val="tx1"/>
+                </a:solidFill>
+                <a:latin typeface="+mn-lt"/>
+                <a:ea typeface="+mn-ea"/>
+                <a:cs typeface="+mn-cs"/>
+              </a:defRPr>
+            </a:lvl3pPr>
+            <a:lvl4pPr marL="1371600" algn="l" defTabSz="914400" rtl="0" eaLnBrk="1" latinLnBrk="0" hangingPunct="1">
+              <a:defRPr sz="1800" kern="1200">
+                <a:solidFill>
+                  <a:schemeClr val="tx1"/>
+                </a:solidFill>
+                <a:latin typeface="+mn-lt"/>
+                <a:ea typeface="+mn-ea"/>
+                <a:cs typeface="+mn-cs"/>
+              </a:defRPr>
+            </a:lvl4pPr>
+            <a:lvl5pPr marL="1828800" algn="l" defTabSz="914400" rtl="0" eaLnBrk="1" latinLnBrk="0" hangingPunct="1">
+              <a:defRPr sz="1800" kern="1200">
+                <a:solidFill>
+                  <a:schemeClr val="tx1"/>
+                </a:solidFill>
+                <a:latin typeface="+mn-lt"/>
+                <a:ea typeface="+mn-ea"/>
+                <a:cs typeface="+mn-cs"/>
+              </a:defRPr>
+            </a:lvl5pPr>
+            <a:lvl6pPr marL="2286000" algn="l" defTabSz="914400" rtl="0" eaLnBrk="1" latinLnBrk="0" hangingPunct="1">
+              <a:defRPr sz="1800" kern="1200">
+                <a:solidFill>
+                  <a:schemeClr val="tx1"/>
+                </a:solidFill>
+                <a:latin typeface="+mn-lt"/>
+                <a:ea typeface="+mn-ea"/>
+                <a:cs typeface="+mn-cs"/>
+              </a:defRPr>
+            </a:lvl6pPr>
+            <a:lvl7pPr marL="2743200" algn="l" defTabSz="914400" rtl="0" eaLnBrk="1" latinLnBrk="0" hangingPunct="1">
+              <a:defRPr sz="1800" kern="1200">
+                <a:solidFill>
+                  <a:schemeClr val="tx1"/>
+                </a:solidFill>
+                <a:latin typeface="+mn-lt"/>
+                <a:ea typeface="+mn-ea"/>
+                <a:cs typeface="+mn-cs"/>
+              </a:defRPr>
+            </a:lvl7pPr>
+            <a:lvl8pPr marL="3200400" algn="l" defTabSz="914400" rtl="0" eaLnBrk="1" latinLnBrk="0" hangingPunct="1">
+              <a:defRPr sz="1800" kern="1200">
+                <a:solidFill>
+                  <a:schemeClr val="tx1"/>
+                </a:solidFill>
+                <a:latin typeface="+mn-lt"/>
+                <a:ea typeface="+mn-ea"/>
+                <a:cs typeface="+mn-cs"/>
+              </a:defRPr>
+            </a:lvl8pPr>
+            <a:lvl9pPr marL="3657600" algn="l" defTabSz="914400" rtl="0" eaLnBrk="1" latinLnBrk="0" hangingPunct="1">
+              <a:defRPr sz="1800" kern="1200">
+                <a:solidFill>
+                  <a:schemeClr val="tx1"/>
+                </a:solidFill>
+                <a:latin typeface="+mn-lt"/>
+                <a:ea typeface="+mn-ea"/>
+                <a:cs typeface="+mn-cs"/>
+              </a:defRPr>
+            </a:lvl9pPr>
+          </a:lstStyle>
+          <a:p>
+            <a:r>
+              <a:rPr lang="en-US" sz="800" dirty="0" smtClean="0">
+                <a:solidFill>
+                  <a:schemeClr val="accent1">
+                    <a:lumMod val="50000"/>
+                  </a:schemeClr>
+                </a:solidFill>
+              </a:rPr>
+              <a:t>Wkl API</a:t>
+            </a:r>
+            <a:endParaRPr lang="en-GB" sz="800" dirty="0">
+              <a:solidFill>
+                <a:schemeClr val="accent1">
+                  <a:lumMod val="50000"/>
+                </a:schemeClr>
+              </a:solidFill>
+            </a:endParaRPr>
+          </a:p>
+        </p:txBody>
+      </p:sp>
     </p:spTree>
     <p:extLst>
       <p:ext uri="{BB962C8B-B14F-4D97-AF65-F5344CB8AC3E}">
@@ -3303,6 +3891,13 @@
   <p:clrMapOvr>
     <a:masterClrMapping/>
   </p:clrMapOvr>
+  <p:timing>
+    <p:tnLst>
+      <p:par>
+        <p:cTn id="1" dur="indefinite" restart="never" nodeType="tmRoot"/>
+      </p:par>
+    </p:tnLst>
+  </p:timing>
 </p:sld>
 </file>
 

</xml_diff>